<commit_message>
Updated USDA county unemployment, powerpoint
</commit_message>
<xml_diff>
--- a/BDSI22_DM_STICOVID_Presentation.pptx
+++ b/BDSI22_DM_STICOVID_Presentation.pptx
@@ -7044,8 +7044,8 @@
         </p:nvSpPr>
         <p:spPr>
           <a:xfrm>
-            <a:off x="15609531" y="6593307"/>
-            <a:ext cx="13740707" cy="610004"/>
+            <a:off x="15609532" y="6593307"/>
+            <a:ext cx="13422668" cy="2173601"/>
           </a:xfrm>
           <a:prstGeom prst="rect">
             <a:avLst/>
@@ -7063,7 +7063,7 @@
               <a:rPr lang="en-US" b="0" baseline="0" dirty="0">
                 <a:latin typeface="Calibri" panose="020F0502020204030204" pitchFamily="34" charset="0"/>
               </a:rPr>
-              <a:t>Insert materials and methods here</a:t>
+              <a:t>We use county level demographic and socioeconomic characteristics from the U.S. Census Bureau’s American Community Survey (2010-20), Intercensal Population Estimates (2002-09), and Small Area Income and Poverty Estimates (2002-09). </a:t>
             </a:r>
           </a:p>
         </p:txBody>
@@ -7172,8 +7172,8 @@
         </p:nvSpPr>
         <p:spPr>
           <a:xfrm>
-            <a:off x="30024064" y="30690218"/>
-            <a:ext cx="14337077" cy="603941"/>
+            <a:off x="30024065" y="30403800"/>
+            <a:ext cx="13813444" cy="1157769"/>
           </a:xfrm>
           <a:prstGeom prst="rect">
             <a:avLst/>
@@ -7189,9 +7189,12 @@
             <a:pPr algn="just"/>
             <a:r>
               <a:rPr lang="en-US" b="0" baseline="0" dirty="0">
+                <a:solidFill>
+                  <a:srgbClr val="00274C"/>
+                </a:solidFill>
                 <a:latin typeface="Calibri" panose="020F0502020204030204" pitchFamily="34" charset="0"/>
               </a:rPr>
-              <a:t>Insert acknowledgements here</a:t>
+              <a:t>Thank you to Dr. Johann Gagnon-Bartsch and Charlotte Mann for advising and mentoring our project.</a:t>
             </a:r>
           </a:p>
         </p:txBody>

</xml_diff>